<commit_message>
Minor updates to pd.rolling.aggregates files
</commit_message>
<xml_diff>
--- a/pd.rolling.aggregate/Introduction to pd.rolling.aggregate.pptx
+++ b/pd.rolling.aggregate/Introduction to pd.rolling.aggregate.pptx
@@ -200,7 +200,7 @@
           <a:p>
             <a:fld id="{DBE02EFB-56AE-4FC5-AA73-9ECED1D5FED8}" type="datetimeFigureOut">
               <a:rPr lang="en-GB" smtClean="0"/>
-              <a:t>11/05/2022</a:t>
+              <a:t>12/05/2022</a:t>
             </a:fld>
             <a:endParaRPr lang="en-GB"/>
           </a:p>
@@ -617,7 +617,7 @@
           <a:p>
             <a:fld id="{03FCC161-5294-43BD-AE11-A59B738D9453}" type="datetime1">
               <a:rPr lang="en-GB" smtClean="0"/>
-              <a:t>11/05/2022</a:t>
+              <a:t>12/05/2022</a:t>
             </a:fld>
             <a:endParaRPr lang="en-GB"/>
           </a:p>
@@ -828,7 +828,7 @@
           <a:p>
             <a:fld id="{F9D4A301-2C04-40E8-8E71-D8A1782189D7}" type="datetime1">
               <a:rPr lang="en-GB" smtClean="0"/>
-              <a:t>11/05/2022</a:t>
+              <a:t>12/05/2022</a:t>
             </a:fld>
             <a:endParaRPr lang="en-GB"/>
           </a:p>
@@ -1041,7 +1041,7 @@
           <a:p>
             <a:fld id="{5C1445AD-42F7-467E-B10D-156D86787B9D}" type="datetime1">
               <a:rPr lang="en-GB" smtClean="0"/>
-              <a:t>11/05/2022</a:t>
+              <a:t>12/05/2022</a:t>
             </a:fld>
             <a:endParaRPr lang="en-GB"/>
           </a:p>
@@ -1244,7 +1244,7 @@
           <a:p>
             <a:fld id="{6D22B8C8-77EE-4DF1-A9F9-17C4818051AF}" type="datetime1">
               <a:rPr lang="en-GB" smtClean="0"/>
-              <a:t>11/05/2022</a:t>
+              <a:t>12/05/2022</a:t>
             </a:fld>
             <a:endParaRPr lang="en-GB"/>
           </a:p>
@@ -1523,7 +1523,7 @@
           <a:p>
             <a:fld id="{00881A06-80AA-4BB5-832A-A5D5A275FA0C}" type="datetime1">
               <a:rPr lang="en-GB" smtClean="0"/>
-              <a:t>11/05/2022</a:t>
+              <a:t>12/05/2022</a:t>
             </a:fld>
             <a:endParaRPr lang="en-GB"/>
           </a:p>
@@ -1794,7 +1794,7 @@
           <a:p>
             <a:fld id="{D34E465C-A564-4785-AC4A-D75B45285B32}" type="datetime1">
               <a:rPr lang="en-GB" smtClean="0"/>
-              <a:t>11/05/2022</a:t>
+              <a:t>12/05/2022</a:t>
             </a:fld>
             <a:endParaRPr lang="en-GB"/>
           </a:p>
@@ -2220,7 +2220,7 @@
           <a:p>
             <a:fld id="{D6D15286-B765-40E4-8083-B869BFD0B0DB}" type="datetime1">
               <a:rPr lang="en-GB" smtClean="0"/>
-              <a:t>11/05/2022</a:t>
+              <a:t>12/05/2022</a:t>
             </a:fld>
             <a:endParaRPr lang="en-GB"/>
           </a:p>
@@ -2365,7 +2365,7 @@
           <a:p>
             <a:fld id="{C652ED8D-BA9E-45AD-92CF-B1FBED3C0F15}" type="datetime1">
               <a:rPr lang="en-GB" smtClean="0"/>
-              <a:t>11/05/2022</a:t>
+              <a:t>12/05/2022</a:t>
             </a:fld>
             <a:endParaRPr lang="en-GB"/>
           </a:p>
@@ -2481,7 +2481,7 @@
           <a:p>
             <a:fld id="{D010D0BA-4AF1-47A2-9697-32853D3896B3}" type="datetime1">
               <a:rPr lang="en-GB" smtClean="0"/>
-              <a:t>11/05/2022</a:t>
+              <a:t>12/05/2022</a:t>
             </a:fld>
             <a:endParaRPr lang="en-GB"/>
           </a:p>
@@ -2797,7 +2797,7 @@
           <a:p>
             <a:fld id="{29FE7AFB-328F-4E6E-B43C-C8E42104CCF3}" type="datetime1">
               <a:rPr lang="en-GB" smtClean="0"/>
-              <a:t>11/05/2022</a:t>
+              <a:t>12/05/2022</a:t>
             </a:fld>
             <a:endParaRPr lang="en-GB"/>
           </a:p>
@@ -3089,7 +3089,7 @@
           <a:p>
             <a:fld id="{7BAC58FE-6323-46F0-BF7B-7B4F95D0F5F9}" type="datetime1">
               <a:rPr lang="en-GB" smtClean="0"/>
-              <a:t>11/05/2022</a:t>
+              <a:t>12/05/2022</a:t>
             </a:fld>
             <a:endParaRPr lang="en-GB"/>
           </a:p>
@@ -3335,7 +3335,7 @@
           <a:p>
             <a:fld id="{7F5C3652-10DE-4F0D-9197-64D59B2188D6}" type="datetime1">
               <a:rPr lang="en-GB" smtClean="0"/>
-              <a:t>11/05/2022</a:t>
+              <a:t>12/05/2022</a:t>
             </a:fld>
             <a:endParaRPr lang="en-GB"/>
           </a:p>
@@ -3884,12 +3884,174 @@
           </a:p>
         </p:txBody>
       </p:sp>
+      <p:grpSp>
+        <p:nvGrpSpPr>
+          <p:cNvPr id="3" name="Group 2">
+            <a:extLst>
+              <a:ext uri="{FF2B5EF4-FFF2-40B4-BE49-F238E27FC236}">
+                <a16:creationId xmlns:a16="http://schemas.microsoft.com/office/drawing/2014/main" id="{8AA14939-DF11-4F7F-920D-B5430F372FB6}"/>
+              </a:ext>
+            </a:extLst>
+          </p:cNvPr>
+          <p:cNvGrpSpPr>
+            <a:grpSpLocks noChangeAspect="1"/>
+          </p:cNvGrpSpPr>
+          <p:nvPr/>
+        </p:nvGrpSpPr>
+        <p:grpSpPr>
+          <a:xfrm>
+            <a:off x="771525" y="5671721"/>
+            <a:ext cx="2613184" cy="1028700"/>
+            <a:chOff x="1581150" y="1714498"/>
+            <a:chExt cx="8710612" cy="3429000"/>
+          </a:xfrm>
+        </p:grpSpPr>
+        <p:pic>
+          <p:nvPicPr>
+            <p:cNvPr id="6" name="Picture 5" descr="A picture containing text, clipart&#10;&#10;Description automatically generated">
+              <a:extLst>
+                <a:ext uri="{FF2B5EF4-FFF2-40B4-BE49-F238E27FC236}">
+                  <a16:creationId xmlns:a16="http://schemas.microsoft.com/office/drawing/2014/main" id="{B9FFEE49-D81B-487E-9A66-D16F51014AB1}"/>
+                </a:ext>
+              </a:extLst>
+            </p:cNvPr>
+            <p:cNvPicPr>
+              <a:picLocks noChangeAspect="1"/>
+            </p:cNvPicPr>
+            <p:nvPr/>
+          </p:nvPicPr>
+          <p:blipFill>
+            <a:blip r:embed="rId2">
+              <a:extLst>
+                <a:ext uri="{28A0092B-C50C-407E-A947-70E740481C1C}">
+                  <a14:useLocalDpi xmlns:a14="http://schemas.microsoft.com/office/drawing/2010/main" val="0"/>
+                </a:ext>
+              </a:extLst>
+            </a:blip>
+            <a:stretch>
+              <a:fillRect/>
+            </a:stretch>
+          </p:blipFill>
+          <p:spPr>
+            <a:xfrm>
+              <a:off x="1581150" y="2519361"/>
+              <a:ext cx="4514850" cy="1819275"/>
+            </a:xfrm>
+            <a:prstGeom prst="rect">
+              <a:avLst/>
+            </a:prstGeom>
+          </p:spPr>
+        </p:pic>
+        <p:pic>
+          <p:nvPicPr>
+            <p:cNvPr id="8" name="Picture 7" descr="Graphical user interface, icon&#10;&#10;Description automatically generated">
+              <a:extLst>
+                <a:ext uri="{FF2B5EF4-FFF2-40B4-BE49-F238E27FC236}">
+                  <a16:creationId xmlns:a16="http://schemas.microsoft.com/office/drawing/2014/main" id="{0EFD081D-5497-4E2B-9142-916C81BB89CA}"/>
+                </a:ext>
+              </a:extLst>
+            </p:cNvPr>
+            <p:cNvPicPr>
+              <a:picLocks noChangeAspect="1"/>
+            </p:cNvPicPr>
+            <p:nvPr/>
+          </p:nvPicPr>
+          <p:blipFill>
+            <a:blip r:embed="rId3">
+              <a:extLst>
+                <a:ext uri="{28A0092B-C50C-407E-A947-70E740481C1C}">
+                  <a14:useLocalDpi xmlns:a14="http://schemas.microsoft.com/office/drawing/2010/main" val="0"/>
+                </a:ext>
+              </a:extLst>
+            </a:blip>
+            <a:stretch>
+              <a:fillRect/>
+            </a:stretch>
+          </p:blipFill>
+          <p:spPr>
+            <a:xfrm>
+              <a:off x="6862762" y="1714498"/>
+              <a:ext cx="3429000" cy="3429000"/>
+            </a:xfrm>
+            <a:prstGeom prst="rect">
+              <a:avLst/>
+            </a:prstGeom>
+          </p:spPr>
+        </p:pic>
+        <p:sp>
+          <p:nvSpPr>
+            <p:cNvPr id="9" name="Arrow: Right 8">
+              <a:extLst>
+                <a:ext uri="{FF2B5EF4-FFF2-40B4-BE49-F238E27FC236}">
+                  <a16:creationId xmlns:a16="http://schemas.microsoft.com/office/drawing/2014/main" id="{33ED1CAF-261B-44AE-9485-C3CA40D84A41}"/>
+                </a:ext>
+              </a:extLst>
+            </p:cNvPr>
+            <p:cNvSpPr/>
+            <p:nvPr/>
+          </p:nvSpPr>
+          <p:spPr>
+            <a:xfrm>
+              <a:off x="6252661" y="3168326"/>
+              <a:ext cx="866775" cy="521344"/>
+            </a:xfrm>
+            <a:prstGeom prst="rightArrow">
+              <a:avLst/>
+            </a:prstGeom>
+            <a:gradFill flip="none" rotWithShape="1">
+              <a:gsLst>
+                <a:gs pos="0">
+                  <a:srgbClr val="15075C"/>
+                </a:gs>
+                <a:gs pos="74000">
+                  <a:srgbClr val="127F46"/>
+                </a:gs>
+                <a:gs pos="83000">
+                  <a:srgbClr val="127F46"/>
+                </a:gs>
+                <a:gs pos="100000">
+                  <a:srgbClr val="127F46"/>
+                </a:gs>
+              </a:gsLst>
+              <a:lin ang="0" scaled="1"/>
+              <a:tileRect/>
+            </a:gradFill>
+            <a:ln>
+              <a:noFill/>
+            </a:ln>
+          </p:spPr>
+          <p:style>
+            <a:lnRef idx="2">
+              <a:schemeClr val="accent6">
+                <a:shade val="50000"/>
+              </a:schemeClr>
+            </a:lnRef>
+            <a:fillRef idx="1">
+              <a:schemeClr val="accent6"/>
+            </a:fillRef>
+            <a:effectRef idx="0">
+              <a:schemeClr val="accent6"/>
+            </a:effectRef>
+            <a:fontRef idx="minor">
+              <a:schemeClr val="lt1"/>
+            </a:fontRef>
+          </p:style>
+          <p:txBody>
+            <a:bodyPr rtlCol="0" anchor="ctr"/>
+            <a:lstStyle/>
+            <a:p>
+              <a:pPr algn="ctr"/>
+              <a:endParaRPr lang="en-GB"/>
+            </a:p>
+          </p:txBody>
+        </p:sp>
+      </p:grpSp>
       <p:pic>
         <p:nvPicPr>
-          <p:cNvPr id="6" name="Picture 5" descr="A picture containing text, clipart&#10;&#10;Description automatically generated">
-            <a:extLst>
-              <a:ext uri="{FF2B5EF4-FFF2-40B4-BE49-F238E27FC236}">
-                <a16:creationId xmlns:a16="http://schemas.microsoft.com/office/drawing/2014/main" id="{B9FFEE49-D81B-487E-9A66-D16F51014AB1}"/>
+          <p:cNvPr id="5" name="Picture 4" descr="Table&#10;&#10;Description automatically generated">
+            <a:extLst>
+              <a:ext uri="{FF2B5EF4-FFF2-40B4-BE49-F238E27FC236}">
+                <a16:creationId xmlns:a16="http://schemas.microsoft.com/office/drawing/2014/main" id="{27D4F3B2-A765-4648-A679-A68918544321}"/>
               </a:ext>
             </a:extLst>
           </p:cNvPr>
@@ -3899,7 +4061,7 @@
           <p:nvPr/>
         </p:nvPicPr>
         <p:blipFill>
-          <a:blip r:embed="rId2">
+          <a:blip r:embed="rId4">
             <a:extLst>
               <a:ext uri="{28A0092B-C50C-407E-A947-70E740481C1C}">
                 <a14:useLocalDpi xmlns:a14="http://schemas.microsoft.com/office/drawing/2010/main" val="0"/>
@@ -3912,117 +4074,24 @@
         </p:blipFill>
         <p:spPr>
           <a:xfrm>
-            <a:off x="1581150" y="2519361"/>
-            <a:ext cx="4514850" cy="1819275"/>
+            <a:off x="2052485" y="1514481"/>
+            <a:ext cx="7953680" cy="4062412"/>
           </a:xfrm>
           <a:prstGeom prst="rect">
             <a:avLst/>
           </a:prstGeom>
-        </p:spPr>
-      </p:pic>
-      <p:pic>
-        <p:nvPicPr>
-          <p:cNvPr id="8" name="Picture 7" descr="Graphical user interface, icon&#10;&#10;Description automatically generated">
-            <a:extLst>
-              <a:ext uri="{FF2B5EF4-FFF2-40B4-BE49-F238E27FC236}">
-                <a16:creationId xmlns:a16="http://schemas.microsoft.com/office/drawing/2014/main" id="{0EFD081D-5497-4E2B-9142-916C81BB89CA}"/>
-              </a:ext>
-            </a:extLst>
-          </p:cNvPr>
-          <p:cNvPicPr>
-            <a:picLocks noChangeAspect="1"/>
-          </p:cNvPicPr>
-          <p:nvPr/>
-        </p:nvPicPr>
-        <p:blipFill>
-          <a:blip r:embed="rId3">
-            <a:extLst>
-              <a:ext uri="{28A0092B-C50C-407E-A947-70E740481C1C}">
-                <a14:useLocalDpi xmlns:a14="http://schemas.microsoft.com/office/drawing/2010/main" val="0"/>
-              </a:ext>
-            </a:extLst>
-          </a:blip>
-          <a:stretch>
-            <a:fillRect/>
-          </a:stretch>
-        </p:blipFill>
-        <p:spPr>
-          <a:xfrm>
-            <a:off x="6862762" y="1714498"/>
-            <a:ext cx="3429000" cy="3429000"/>
-          </a:xfrm>
-          <a:prstGeom prst="rect">
-            <a:avLst/>
-          </a:prstGeom>
-        </p:spPr>
-      </p:pic>
-      <p:sp>
-        <p:nvSpPr>
-          <p:cNvPr id="9" name="Arrow: Right 8">
-            <a:extLst>
-              <a:ext uri="{FF2B5EF4-FFF2-40B4-BE49-F238E27FC236}">
-                <a16:creationId xmlns:a16="http://schemas.microsoft.com/office/drawing/2014/main" id="{33ED1CAF-261B-44AE-9485-C3CA40D84A41}"/>
-              </a:ext>
-            </a:extLst>
-          </p:cNvPr>
-          <p:cNvSpPr/>
-          <p:nvPr/>
-        </p:nvSpPr>
-        <p:spPr>
-          <a:xfrm>
-            <a:off x="6252661" y="3168326"/>
-            <a:ext cx="866775" cy="521344"/>
-          </a:xfrm>
-          <a:prstGeom prst="rightArrow">
-            <a:avLst/>
-          </a:prstGeom>
-          <a:gradFill flip="none" rotWithShape="1">
-            <a:gsLst>
-              <a:gs pos="0">
-                <a:srgbClr val="15075C"/>
-              </a:gs>
-              <a:gs pos="74000">
-                <a:srgbClr val="127F46"/>
-              </a:gs>
-              <a:gs pos="83000">
-                <a:srgbClr val="127F46"/>
-              </a:gs>
-              <a:gs pos="100000">
-                <a:srgbClr val="127F46"/>
-              </a:gs>
-            </a:gsLst>
-            <a:lin ang="0" scaled="1"/>
-            <a:tileRect/>
-          </a:gradFill>
           <a:ln>
             <a:noFill/>
           </a:ln>
+          <a:effectLst>
+            <a:outerShdw blurRad="190500" algn="tl" rotWithShape="0">
+              <a:srgbClr val="000000">
+                <a:alpha val="70000"/>
+              </a:srgbClr>
+            </a:outerShdw>
+          </a:effectLst>
         </p:spPr>
-        <p:style>
-          <a:lnRef idx="2">
-            <a:schemeClr val="accent6">
-              <a:shade val="50000"/>
-            </a:schemeClr>
-          </a:lnRef>
-          <a:fillRef idx="1">
-            <a:schemeClr val="accent6"/>
-          </a:fillRef>
-          <a:effectRef idx="0">
-            <a:schemeClr val="accent6"/>
-          </a:effectRef>
-          <a:fontRef idx="minor">
-            <a:schemeClr val="lt1"/>
-          </a:fontRef>
-        </p:style>
-        <p:txBody>
-          <a:bodyPr rtlCol="0" anchor="ctr"/>
-          <a:lstStyle/>
-          <a:p>
-            <a:pPr algn="ctr"/>
-            <a:endParaRPr lang="en-GB"/>
-          </a:p>
-        </p:txBody>
-      </p:sp>
+      </p:pic>
     </p:spTree>
     <p:extLst>
       <p:ext uri="{BB962C8B-B14F-4D97-AF65-F5344CB8AC3E}">

</xml_diff>